<commit_message>
Kontakt na tým - cognitive.cisco.com
</commit_message>
<xml_diff>
--- a/slides.pptx
+++ b/slides.pptx
@@ -303,7 +303,7 @@
               <a:pPr>
                 <a:defRPr/>
               </a:pPr>
-              <a:t>10/17/22</a:t>
+              <a:t>10/18/22</a:t>
             </a:fld>
             <a:endParaRPr lang="en-US"/>
           </a:p>
@@ -527,7 +527,7 @@
               <a:pPr>
                 <a:defRPr/>
               </a:pPr>
-              <a:t>10/17/22</a:t>
+              <a:t>10/18/22</a:t>
             </a:fld>
             <a:endParaRPr lang="en-US"/>
           </a:p>
@@ -5604,7 +5604,7 @@
               </a14:hiddenLine>
             </a:ext>
             <a:ext uri="{FAA26D3D-D897-4be2-8F04-BA451C77F1D7}">
-              <ma14:placeholderFlag xmlns:ma14="http://schemas.microsoft.com/office/mac/drawingml/2011/main" xmlns="" val="1"/>
+              <ma14:placeholderFlag xmlns="" xmlns:ma14="http://schemas.microsoft.com/office/mac/drawingml/2011/main" val="1"/>
             </a:ext>
           </a:extLst>
         </p:spPr>
@@ -5824,7 +5824,7 @@
               </a14:hiddenLine>
             </a:ext>
             <a:ext uri="{FAA26D3D-D897-4be2-8F04-BA451C77F1D7}">
-              <ma14:placeholderFlag xmlns:ma14="http://schemas.microsoft.com/office/mac/drawingml/2011/main" xmlns="" val="1"/>
+              <ma14:placeholderFlag xmlns="" xmlns:ma14="http://schemas.microsoft.com/office/mac/drawingml/2011/main" val="1"/>
             </a:ext>
           </a:extLst>
         </p:spPr>
@@ -5999,7 +5999,7 @@
               </a14:hiddenLine>
             </a:ext>
             <a:ext uri="{FAA26D3D-D897-4be2-8F04-BA451C77F1D7}">
-              <ma14:placeholderFlag xmlns:ma14="http://schemas.microsoft.com/office/mac/drawingml/2011/main" xmlns="" val="1"/>
+              <ma14:placeholderFlag xmlns="" xmlns:ma14="http://schemas.microsoft.com/office/mac/drawingml/2011/main" val="1"/>
             </a:ext>
           </a:extLst>
         </p:spPr>
@@ -6171,7 +6171,7 @@
               </a14:hiddenLine>
             </a:ext>
             <a:ext uri="{FAA26D3D-D897-4be2-8F04-BA451C77F1D7}">
-              <ma14:placeholderFlag xmlns:ma14="http://schemas.microsoft.com/office/mac/drawingml/2011/main" xmlns="" val="1"/>
+              <ma14:placeholderFlag xmlns="" xmlns:ma14="http://schemas.microsoft.com/office/mac/drawingml/2011/main" val="1"/>
             </a:ext>
           </a:extLst>
         </p:spPr>
@@ -6388,7 +6388,7 @@
               </a14:hiddenLine>
             </a:ext>
             <a:ext uri="{FAA26D3D-D897-4be2-8F04-BA451C77F1D7}">
-              <ma14:placeholderFlag xmlns:ma14="http://schemas.microsoft.com/office/mac/drawingml/2011/main" xmlns="" val="1"/>
+              <ma14:placeholderFlag xmlns="" xmlns:ma14="http://schemas.microsoft.com/office/mac/drawingml/2011/main" val="1"/>
             </a:ext>
           </a:extLst>
         </p:spPr>
@@ -6488,7 +6488,7 @@
               </a14:hiddenLine>
             </a:ext>
             <a:ext uri="{FAA26D3D-D897-4be2-8F04-BA451C77F1D7}">
-              <ma14:placeholderFlag xmlns:ma14="http://schemas.microsoft.com/office/mac/drawingml/2011/main" xmlns="" val="1"/>
+              <ma14:placeholderFlag xmlns="" xmlns:ma14="http://schemas.microsoft.com/office/mac/drawingml/2011/main" val="1"/>
             </a:ext>
           </a:extLst>
         </p:spPr>
@@ -6732,7 +6732,7 @@
               </a14:hiddenLine>
             </a:ext>
             <a:ext uri="{FAA26D3D-D897-4be2-8F04-BA451C77F1D7}">
-              <ma14:placeholderFlag xmlns:ma14="http://schemas.microsoft.com/office/mac/drawingml/2011/main" xmlns="" val="1"/>
+              <ma14:placeholderFlag xmlns="" xmlns:ma14="http://schemas.microsoft.com/office/mac/drawingml/2011/main" val="1"/>
             </a:ext>
           </a:extLst>
         </p:spPr>
@@ -7076,7 +7076,7 @@
               </a14:hiddenLine>
             </a:ext>
             <a:ext uri="{FAA26D3D-D897-4be2-8F04-BA451C77F1D7}">
-              <ma14:placeholderFlag xmlns:ma14="http://schemas.microsoft.com/office/mac/drawingml/2011/main" xmlns="" val="1"/>
+              <ma14:placeholderFlag xmlns="" xmlns:ma14="http://schemas.microsoft.com/office/mac/drawingml/2011/main" val="1"/>
             </a:ext>
           </a:extLst>
         </p:spPr>
@@ -7245,7 +7245,7 @@
               </a14:hiddenLine>
             </a:ext>
             <a:ext uri="{FAA26D3D-D897-4be2-8F04-BA451C77F1D7}">
-              <ma14:placeholderFlag xmlns:ma14="http://schemas.microsoft.com/office/mac/drawingml/2011/main" xmlns="" val="1"/>
+              <ma14:placeholderFlag xmlns="" xmlns:ma14="http://schemas.microsoft.com/office/mac/drawingml/2011/main" val="1"/>
             </a:ext>
           </a:extLst>
         </p:spPr>
@@ -7417,7 +7417,7 @@
               </a14:hiddenLine>
             </a:ext>
             <a:ext uri="{FAA26D3D-D897-4be2-8F04-BA451C77F1D7}">
-              <ma14:placeholderFlag xmlns:ma14="http://schemas.microsoft.com/office/mac/drawingml/2011/main" xmlns="" val="1"/>
+              <ma14:placeholderFlag xmlns="" xmlns:ma14="http://schemas.microsoft.com/office/mac/drawingml/2011/main" val="1"/>
             </a:ext>
           </a:extLst>
         </p:spPr>
@@ -7634,7 +7634,7 @@
               </a14:hiddenLine>
             </a:ext>
             <a:ext uri="{FAA26D3D-D897-4be2-8F04-BA451C77F1D7}">
-              <ma14:placeholderFlag xmlns:ma14="http://schemas.microsoft.com/office/mac/drawingml/2011/main" xmlns="" val="1"/>
+              <ma14:placeholderFlag xmlns="" xmlns:ma14="http://schemas.microsoft.com/office/mac/drawingml/2011/main" val="1"/>
             </a:ext>
           </a:extLst>
         </p:spPr>
@@ -7734,7 +7734,7 @@
               </a14:hiddenLine>
             </a:ext>
             <a:ext uri="{FAA26D3D-D897-4be2-8F04-BA451C77F1D7}">
-              <ma14:placeholderFlag xmlns:ma14="http://schemas.microsoft.com/office/mac/drawingml/2011/main" xmlns="" val="1"/>
+              <ma14:placeholderFlag xmlns="" xmlns:ma14="http://schemas.microsoft.com/office/mac/drawingml/2011/main" val="1"/>
             </a:ext>
           </a:extLst>
         </p:spPr>
@@ -7986,7 +7986,7 @@
               </a14:hiddenLine>
             </a:ext>
             <a:ext uri="{FAA26D3D-D897-4be2-8F04-BA451C77F1D7}">
-              <ma14:placeholderFlag xmlns:ma14="http://schemas.microsoft.com/office/mac/drawingml/2011/main" xmlns="" val="1"/>
+              <ma14:placeholderFlag xmlns="" xmlns:ma14="http://schemas.microsoft.com/office/mac/drawingml/2011/main" val="1"/>
             </a:ext>
           </a:extLst>
         </p:spPr>
@@ -8833,7 +8833,7 @@
               </a14:hiddenLine>
             </a:ext>
             <a:ext uri="{FAA26D3D-D897-4be2-8F04-BA451C77F1D7}">
-              <ma14:placeholderFlag xmlns:ma14="http://schemas.microsoft.com/office/mac/drawingml/2011/main" xmlns="" val="1"/>
+              <ma14:placeholderFlag xmlns="" xmlns:ma14="http://schemas.microsoft.com/office/mac/drawingml/2011/main" val="1"/>
             </a:ext>
           </a:extLst>
         </p:spPr>
@@ -15181,12 +15181,50 @@
           </p:sp>
         </p:grpSp>
       </p:grpSp>
+      <p:sp>
+        <p:nvSpPr>
+          <p:cNvPr id="11" name="TextBox 10">
+            <a:extLst>
+              <a:ext uri="{FF2B5EF4-FFF2-40B4-BE49-F238E27FC236}">
+                <a16:creationId xmlns:a16="http://schemas.microsoft.com/office/drawing/2014/main" id="{CE46CD50-0AB3-6902-36C0-F99F4F555437}"/>
+              </a:ext>
+            </a:extLst>
+          </p:cNvPr>
+          <p:cNvSpPr txBox="1"/>
+          <p:nvPr/>
+        </p:nvSpPr>
+        <p:spPr>
+          <a:xfrm>
+            <a:off x="3426288" y="4166108"/>
+            <a:ext cx="2206038" cy="369332"/>
+          </a:xfrm>
+          <a:prstGeom prst="rect">
+            <a:avLst/>
+          </a:prstGeom>
+          <a:noFill/>
+        </p:spPr>
+        <p:txBody>
+          <a:bodyPr wrap="square">
+            <a:spAutoFit/>
+          </a:bodyPr>
+          <a:lstStyle/>
+          <a:p>
+            <a:r>
+              <a:rPr lang="en-CZ" dirty="0">
+                <a:hlinkClick r:id="rId4"/>
+              </a:rPr>
+              <a:t>cognitive.cisco.com</a:t>
+            </a:r>
+            <a:endParaRPr lang="en-CZ" dirty="0"/>
+          </a:p>
+        </p:txBody>
+      </p:sp>
       <p:pic>
         <p:nvPicPr>
-          <p:cNvPr id="9" name="Picture 8" descr="repositář s ukázkami">
+          <p:cNvPr id="15" name="Picture 14">
             <a:extLst>
               <a:ext uri="{FF2B5EF4-FFF2-40B4-BE49-F238E27FC236}">
-                <a16:creationId xmlns:a16="http://schemas.microsoft.com/office/drawing/2014/main" id="{E7C08F54-C5FD-4D35-2648-FF821C6010DD}"/>
+                <a16:creationId xmlns:a16="http://schemas.microsoft.com/office/drawing/2014/main" id="{4A22D5B4-EEF5-0C1C-3DF6-6C3FC863144A}"/>
               </a:ext>
             </a:extLst>
           </p:cNvPr>
@@ -15196,15 +15234,15 @@
           <p:nvPr/>
         </p:nvPicPr>
         <p:blipFill>
-          <a:blip r:embed="rId4"/>
+          <a:blip r:embed="rId5"/>
           <a:stretch>
             <a:fillRect/>
           </a:stretch>
         </p:blipFill>
         <p:spPr>
           <a:xfrm>
-            <a:off x="7288306" y="3329479"/>
-            <a:ext cx="1682502" cy="1682502"/>
+            <a:off x="7040441" y="3125507"/>
+            <a:ext cx="1905000" cy="1905000"/>
           </a:xfrm>
           <a:prstGeom prst="rect">
             <a:avLst/>
@@ -24047,6 +24085,15 @@
 </file>
 
 <file path=customXml/item1.xml><?xml version="1.0" encoding="utf-8"?>
+<?mso-contentType ?>
+<FormTemplates xmlns="http://schemas.microsoft.com/sharepoint/v3/contenttype/forms">
+  <Display>DocumentLibraryForm</Display>
+  <Edit>DocumentLibraryForm</Edit>
+  <New>DocumentLibraryForm</New>
+</FormTemplates>
+</file>
+
+<file path=customXml/item2.xml><?xml version="1.0" encoding="utf-8"?>
 <ct:contentTypeSchema xmlns:ct="http://schemas.microsoft.com/office/2006/metadata/contentType" xmlns:ma="http://schemas.microsoft.com/office/2006/metadata/properties/metaAttributes" ct:_="" ma:_="" ma:contentTypeName="Document" ma:contentTypeID="0x0101004E71787C45E5F244B9C5DE012A282E6E" ma:contentTypeVersion="2" ma:contentTypeDescription="Create a new document." ma:contentTypeScope="" ma:versionID="2c982a04c80c91fce4b15b1d2899d940">
   <xsd:schema xmlns:xsd="http://www.w3.org/2001/XMLSchema" xmlns:xs="http://www.w3.org/2001/XMLSchema" xmlns:p="http://schemas.microsoft.com/office/2006/metadata/properties" xmlns:ns2="c7d20101-ead6-47a4-bffd-99eeee7d3fd8" targetNamespace="http://schemas.microsoft.com/office/2006/metadata/properties" ma:root="true" ma:fieldsID="2a0773c32723f9384eb41097c3268182" ns2:_="">
     <xsd:import namespace="c7d20101-ead6-47a4-bffd-99eeee7d3fd8"/>
@@ -24178,15 +24225,6 @@
 </ct:contentTypeSchema>
 </file>
 
-<file path=customXml/item2.xml><?xml version="1.0" encoding="utf-8"?>
-<?mso-contentType ?>
-<FormTemplates xmlns="http://schemas.microsoft.com/sharepoint/v3/contenttype/forms">
-  <Display>DocumentLibraryForm</Display>
-  <Edit>DocumentLibraryForm</Edit>
-  <New>DocumentLibraryForm</New>
-</FormTemplates>
-</file>
-
 <file path=customXml/item3.xml><?xml version="1.0" encoding="utf-8"?>
 <p:properties xmlns:p="http://schemas.microsoft.com/office/2006/metadata/properties" xmlns:xsi="http://www.w3.org/2001/XMLSchema-instance" xmlns:pc="http://schemas.microsoft.com/office/infopath/2007/PartnerControls">
   <documentManagement/>
@@ -24194,6 +24232,14 @@
 </file>
 
 <file path=customXml/itemProps1.xml><?xml version="1.0" encoding="utf-8"?>
+<ds:datastoreItem xmlns:ds="http://schemas.openxmlformats.org/officeDocument/2006/customXml" ds:itemID="{B213437A-2FCC-40C8-AAB3-BEE3478FAE1C}">
+  <ds:schemaRefs>
+    <ds:schemaRef ds:uri="http://schemas.microsoft.com/sharepoint/v3/contenttype/forms"/>
+  </ds:schemaRefs>
+</ds:datastoreItem>
+</file>
+
+<file path=customXml/itemProps2.xml><?xml version="1.0" encoding="utf-8"?>
 <ds:datastoreItem xmlns:ds="http://schemas.openxmlformats.org/officeDocument/2006/customXml" ds:itemID="{1E808D5B-CC6C-4BB2-9C17-3C8BE7C17053}">
   <ds:schemaRefs>
     <ds:schemaRef ds:uri="http://schemas.microsoft.com/office/2006/metadata/contentType"/>
@@ -24207,14 +24253,6 @@
     <ds:schemaRef ds:uri="http://purl.org/dc/elements/1.1/"/>
     <ds:schemaRef ds:uri="http://purl.org/dc/terms/"/>
     <ds:schemaRef ds:uri="http://schemas.microsoft.com/internal/obd"/>
-  </ds:schemaRefs>
-</ds:datastoreItem>
-</file>
-
-<file path=customXml/itemProps2.xml><?xml version="1.0" encoding="utf-8"?>
-<ds:datastoreItem xmlns:ds="http://schemas.openxmlformats.org/officeDocument/2006/customXml" ds:itemID="{B213437A-2FCC-40C8-AAB3-BEE3478FAE1C}">
-  <ds:schemaRefs>
-    <ds:schemaRef ds:uri="http://schemas.microsoft.com/sharepoint/v3/contenttype/forms"/>
   </ds:schemaRefs>
 </ds:datastoreItem>
 </file>

</xml_diff>

<commit_message>
Poslední drobná zlepšení před a během přednášky
</commit_message>
<xml_diff>
--- a/slides.pptx
+++ b/slides.pptx
@@ -5604,7 +5604,7 @@
               </a14:hiddenLine>
             </a:ext>
             <a:ext uri="{FAA26D3D-D897-4be2-8F04-BA451C77F1D7}">
-              <ma14:placeholderFlag xmlns="" xmlns:ma14="http://schemas.microsoft.com/office/mac/drawingml/2011/main" val="1"/>
+              <ma14:placeholderFlag xmlns:ma14="http://schemas.microsoft.com/office/mac/drawingml/2011/main" xmlns="" val="1"/>
             </a:ext>
           </a:extLst>
         </p:spPr>
@@ -5824,7 +5824,7 @@
               </a14:hiddenLine>
             </a:ext>
             <a:ext uri="{FAA26D3D-D897-4be2-8F04-BA451C77F1D7}">
-              <ma14:placeholderFlag xmlns="" xmlns:ma14="http://schemas.microsoft.com/office/mac/drawingml/2011/main" val="1"/>
+              <ma14:placeholderFlag xmlns:ma14="http://schemas.microsoft.com/office/mac/drawingml/2011/main" xmlns="" val="1"/>
             </a:ext>
           </a:extLst>
         </p:spPr>
@@ -5999,7 +5999,7 @@
               </a14:hiddenLine>
             </a:ext>
             <a:ext uri="{FAA26D3D-D897-4be2-8F04-BA451C77F1D7}">
-              <ma14:placeholderFlag xmlns="" xmlns:ma14="http://schemas.microsoft.com/office/mac/drawingml/2011/main" val="1"/>
+              <ma14:placeholderFlag xmlns:ma14="http://schemas.microsoft.com/office/mac/drawingml/2011/main" xmlns="" val="1"/>
             </a:ext>
           </a:extLst>
         </p:spPr>
@@ -6171,7 +6171,7 @@
               </a14:hiddenLine>
             </a:ext>
             <a:ext uri="{FAA26D3D-D897-4be2-8F04-BA451C77F1D7}">
-              <ma14:placeholderFlag xmlns="" xmlns:ma14="http://schemas.microsoft.com/office/mac/drawingml/2011/main" val="1"/>
+              <ma14:placeholderFlag xmlns:ma14="http://schemas.microsoft.com/office/mac/drawingml/2011/main" xmlns="" val="1"/>
             </a:ext>
           </a:extLst>
         </p:spPr>
@@ -6388,7 +6388,7 @@
               </a14:hiddenLine>
             </a:ext>
             <a:ext uri="{FAA26D3D-D897-4be2-8F04-BA451C77F1D7}">
-              <ma14:placeholderFlag xmlns="" xmlns:ma14="http://schemas.microsoft.com/office/mac/drawingml/2011/main" val="1"/>
+              <ma14:placeholderFlag xmlns:ma14="http://schemas.microsoft.com/office/mac/drawingml/2011/main" xmlns="" val="1"/>
             </a:ext>
           </a:extLst>
         </p:spPr>
@@ -6488,7 +6488,7 @@
               </a14:hiddenLine>
             </a:ext>
             <a:ext uri="{FAA26D3D-D897-4be2-8F04-BA451C77F1D7}">
-              <ma14:placeholderFlag xmlns="" xmlns:ma14="http://schemas.microsoft.com/office/mac/drawingml/2011/main" val="1"/>
+              <ma14:placeholderFlag xmlns:ma14="http://schemas.microsoft.com/office/mac/drawingml/2011/main" xmlns="" val="1"/>
             </a:ext>
           </a:extLst>
         </p:spPr>
@@ -6732,7 +6732,7 @@
               </a14:hiddenLine>
             </a:ext>
             <a:ext uri="{FAA26D3D-D897-4be2-8F04-BA451C77F1D7}">
-              <ma14:placeholderFlag xmlns="" xmlns:ma14="http://schemas.microsoft.com/office/mac/drawingml/2011/main" val="1"/>
+              <ma14:placeholderFlag xmlns:ma14="http://schemas.microsoft.com/office/mac/drawingml/2011/main" xmlns="" val="1"/>
             </a:ext>
           </a:extLst>
         </p:spPr>
@@ -7076,7 +7076,7 @@
               </a14:hiddenLine>
             </a:ext>
             <a:ext uri="{FAA26D3D-D897-4be2-8F04-BA451C77F1D7}">
-              <ma14:placeholderFlag xmlns="" xmlns:ma14="http://schemas.microsoft.com/office/mac/drawingml/2011/main" val="1"/>
+              <ma14:placeholderFlag xmlns:ma14="http://schemas.microsoft.com/office/mac/drawingml/2011/main" xmlns="" val="1"/>
             </a:ext>
           </a:extLst>
         </p:spPr>
@@ -7245,7 +7245,7 @@
               </a14:hiddenLine>
             </a:ext>
             <a:ext uri="{FAA26D3D-D897-4be2-8F04-BA451C77F1D7}">
-              <ma14:placeholderFlag xmlns="" xmlns:ma14="http://schemas.microsoft.com/office/mac/drawingml/2011/main" val="1"/>
+              <ma14:placeholderFlag xmlns:ma14="http://schemas.microsoft.com/office/mac/drawingml/2011/main" xmlns="" val="1"/>
             </a:ext>
           </a:extLst>
         </p:spPr>
@@ -7417,7 +7417,7 @@
               </a14:hiddenLine>
             </a:ext>
             <a:ext uri="{FAA26D3D-D897-4be2-8F04-BA451C77F1D7}">
-              <ma14:placeholderFlag xmlns="" xmlns:ma14="http://schemas.microsoft.com/office/mac/drawingml/2011/main" val="1"/>
+              <ma14:placeholderFlag xmlns:ma14="http://schemas.microsoft.com/office/mac/drawingml/2011/main" xmlns="" val="1"/>
             </a:ext>
           </a:extLst>
         </p:spPr>
@@ -7634,7 +7634,7 @@
               </a14:hiddenLine>
             </a:ext>
             <a:ext uri="{FAA26D3D-D897-4be2-8F04-BA451C77F1D7}">
-              <ma14:placeholderFlag xmlns="" xmlns:ma14="http://schemas.microsoft.com/office/mac/drawingml/2011/main" val="1"/>
+              <ma14:placeholderFlag xmlns:ma14="http://schemas.microsoft.com/office/mac/drawingml/2011/main" xmlns="" val="1"/>
             </a:ext>
           </a:extLst>
         </p:spPr>
@@ -7734,7 +7734,7 @@
               </a14:hiddenLine>
             </a:ext>
             <a:ext uri="{FAA26D3D-D897-4be2-8F04-BA451C77F1D7}">
-              <ma14:placeholderFlag xmlns="" xmlns:ma14="http://schemas.microsoft.com/office/mac/drawingml/2011/main" val="1"/>
+              <ma14:placeholderFlag xmlns:ma14="http://schemas.microsoft.com/office/mac/drawingml/2011/main" xmlns="" val="1"/>
             </a:ext>
           </a:extLst>
         </p:spPr>
@@ -7986,7 +7986,7 @@
               </a14:hiddenLine>
             </a:ext>
             <a:ext uri="{FAA26D3D-D897-4be2-8F04-BA451C77F1D7}">
-              <ma14:placeholderFlag xmlns="" xmlns:ma14="http://schemas.microsoft.com/office/mac/drawingml/2011/main" val="1"/>
+              <ma14:placeholderFlag xmlns:ma14="http://schemas.microsoft.com/office/mac/drawingml/2011/main" xmlns="" val="1"/>
             </a:ext>
           </a:extLst>
         </p:spPr>
@@ -8833,7 +8833,7 @@
               </a14:hiddenLine>
             </a:ext>
             <a:ext uri="{FAA26D3D-D897-4be2-8F04-BA451C77F1D7}">
-              <ma14:placeholderFlag xmlns="" xmlns:ma14="http://schemas.microsoft.com/office/mac/drawingml/2011/main" val="1"/>
+              <ma14:placeholderFlag xmlns:ma14="http://schemas.microsoft.com/office/mac/drawingml/2011/main" xmlns="" val="1"/>
             </a:ext>
           </a:extLst>
         </p:spPr>
@@ -15195,8 +15195,8 @@
         </p:nvSpPr>
         <p:spPr>
           <a:xfrm>
-            <a:off x="3426288" y="4166108"/>
-            <a:ext cx="2206038" cy="369332"/>
+            <a:off x="3074133" y="4078007"/>
+            <a:ext cx="2910348" cy="461665"/>
           </a:xfrm>
           <a:prstGeom prst="rect">
             <a:avLst/>
@@ -15210,12 +15210,12 @@
           <a:lstStyle/>
           <a:p>
             <a:r>
-              <a:rPr lang="en-CZ" dirty="0">
+              <a:rPr lang="en-CZ" sz="2400" dirty="0">
                 <a:hlinkClick r:id="rId4"/>
               </a:rPr>
               <a:t>cognitive.cisco.com</a:t>
             </a:r>
-            <a:endParaRPr lang="en-CZ" dirty="0"/>
+            <a:endParaRPr lang="en-CZ" sz="2400" dirty="0"/>
           </a:p>
         </p:txBody>
       </p:sp>
@@ -24085,12 +24085,9 @@
 </file>
 
 <file path=customXml/item1.xml><?xml version="1.0" encoding="utf-8"?>
-<?mso-contentType ?>
-<FormTemplates xmlns="http://schemas.microsoft.com/sharepoint/v3/contenttype/forms">
-  <Display>DocumentLibraryForm</Display>
-  <Edit>DocumentLibraryForm</Edit>
-  <New>DocumentLibraryForm</New>
-</FormTemplates>
+<p:properties xmlns:p="http://schemas.microsoft.com/office/2006/metadata/properties" xmlns:xsi="http://www.w3.org/2001/XMLSchema-instance" xmlns:pc="http://schemas.microsoft.com/office/infopath/2007/PartnerControls">
+  <documentManagement/>
+</p:properties>
 </file>
 
 <file path=customXml/item2.xml><?xml version="1.0" encoding="utf-8"?>
@@ -24226,15 +24223,25 @@
 </file>
 
 <file path=customXml/item3.xml><?xml version="1.0" encoding="utf-8"?>
-<p:properties xmlns:p="http://schemas.microsoft.com/office/2006/metadata/properties" xmlns:xsi="http://www.w3.org/2001/XMLSchema-instance" xmlns:pc="http://schemas.microsoft.com/office/infopath/2007/PartnerControls">
-  <documentManagement/>
-</p:properties>
+<?mso-contentType ?>
+<FormTemplates xmlns="http://schemas.microsoft.com/sharepoint/v3/contenttype/forms">
+  <Display>DocumentLibraryForm</Display>
+  <Edit>DocumentLibraryForm</Edit>
+  <New>DocumentLibraryForm</New>
+</FormTemplates>
 </file>
 
 <file path=customXml/itemProps1.xml><?xml version="1.0" encoding="utf-8"?>
-<ds:datastoreItem xmlns:ds="http://schemas.openxmlformats.org/officeDocument/2006/customXml" ds:itemID="{B213437A-2FCC-40C8-AAB3-BEE3478FAE1C}">
+<ds:datastoreItem xmlns:ds="http://schemas.openxmlformats.org/officeDocument/2006/customXml" ds:itemID="{CC4E404F-D0C8-47D4-B36C-3BDD3926F585}">
   <ds:schemaRefs>
-    <ds:schemaRef ds:uri="http://schemas.microsoft.com/sharepoint/v3/contenttype/forms"/>
+    <ds:schemaRef ds:uri="http://schemas.microsoft.com/office/2006/documentManagement/types"/>
+    <ds:schemaRef ds:uri="http://schemas.microsoft.com/office/2006/metadata/properties"/>
+    <ds:schemaRef ds:uri="http://purl.org/dc/dcmitype/"/>
+    <ds:schemaRef ds:uri="http://purl.org/dc/terms/"/>
+    <ds:schemaRef ds:uri="http://purl.org/dc/elements/1.1/"/>
+    <ds:schemaRef ds:uri="http://schemas.microsoft.com/office/infopath/2007/PartnerControls"/>
+    <ds:schemaRef ds:uri="http://schemas.openxmlformats.org/package/2006/metadata/core-properties"/>
+    <ds:schemaRef ds:uri="http://www.w3.org/XML/1998/namespace"/>
   </ds:schemaRefs>
 </ds:datastoreItem>
 </file>
@@ -24258,16 +24265,9 @@
 </file>
 
 <file path=customXml/itemProps3.xml><?xml version="1.0" encoding="utf-8"?>
-<ds:datastoreItem xmlns:ds="http://schemas.openxmlformats.org/officeDocument/2006/customXml" ds:itemID="{CC4E404F-D0C8-47D4-B36C-3BDD3926F585}">
+<ds:datastoreItem xmlns:ds="http://schemas.openxmlformats.org/officeDocument/2006/customXml" ds:itemID="{B213437A-2FCC-40C8-AAB3-BEE3478FAE1C}">
   <ds:schemaRefs>
-    <ds:schemaRef ds:uri="http://schemas.microsoft.com/office/2006/documentManagement/types"/>
-    <ds:schemaRef ds:uri="http://schemas.microsoft.com/office/2006/metadata/properties"/>
-    <ds:schemaRef ds:uri="http://purl.org/dc/dcmitype/"/>
-    <ds:schemaRef ds:uri="http://purl.org/dc/terms/"/>
-    <ds:schemaRef ds:uri="http://purl.org/dc/elements/1.1/"/>
-    <ds:schemaRef ds:uri="http://schemas.microsoft.com/office/infopath/2007/PartnerControls"/>
-    <ds:schemaRef ds:uri="http://schemas.openxmlformats.org/package/2006/metadata/core-properties"/>
-    <ds:schemaRef ds:uri="http://www.w3.org/XML/1998/namespace"/>
+    <ds:schemaRef ds:uri="http://schemas.microsoft.com/sharepoint/v3/contenttype/forms"/>
   </ds:schemaRefs>
 </ds:datastoreItem>
 </file>
</xml_diff>